<commit_message>
Policy for hybrid claims sample
</commit_message>
<xml_diff>
--- a/Doc/Architecture.pptx
+++ b/Doc/Architecture.pptx
@@ -7,6 +7,7 @@
   <p:sldIdLst>
     <p:sldId id="258" r:id="rId2"/>
     <p:sldId id="257" r:id="rId3"/>
+    <p:sldId id="259" r:id="rId4"/>
   </p:sldIdLst>
   <p:sldSz cx="12192000" cy="6858000"/>
   <p:notesSz cx="6858000" cy="9144000"/>
@@ -262,7 +263,7 @@
           <a:p>
             <a:fld id="{308EF277-7957-4950-8844-43C656DF05A1}" type="datetimeFigureOut">
               <a:rPr lang="en-US" smtClean="0"/>
-              <a:t>10/2/2019</a:t>
+              <a:t>10/5/2019</a:t>
             </a:fld>
             <a:endParaRPr lang="en-US"/>
           </a:p>
@@ -462,7 +463,7 @@
           <a:p>
             <a:fld id="{308EF277-7957-4950-8844-43C656DF05A1}" type="datetimeFigureOut">
               <a:rPr lang="en-US" smtClean="0"/>
-              <a:t>10/2/2019</a:t>
+              <a:t>10/5/2019</a:t>
             </a:fld>
             <a:endParaRPr lang="en-US"/>
           </a:p>
@@ -672,7 +673,7 @@
           <a:p>
             <a:fld id="{308EF277-7957-4950-8844-43C656DF05A1}" type="datetimeFigureOut">
               <a:rPr lang="en-US" smtClean="0"/>
-              <a:t>10/2/2019</a:t>
+              <a:t>10/5/2019</a:t>
             </a:fld>
             <a:endParaRPr lang="en-US"/>
           </a:p>
@@ -872,7 +873,7 @@
           <a:p>
             <a:fld id="{308EF277-7957-4950-8844-43C656DF05A1}" type="datetimeFigureOut">
               <a:rPr lang="en-US" smtClean="0"/>
-              <a:t>10/2/2019</a:t>
+              <a:t>10/5/2019</a:t>
             </a:fld>
             <a:endParaRPr lang="en-US"/>
           </a:p>
@@ -1148,7 +1149,7 @@
           <a:p>
             <a:fld id="{308EF277-7957-4950-8844-43C656DF05A1}" type="datetimeFigureOut">
               <a:rPr lang="en-US" smtClean="0"/>
-              <a:t>10/2/2019</a:t>
+              <a:t>10/5/2019</a:t>
             </a:fld>
             <a:endParaRPr lang="en-US"/>
           </a:p>
@@ -1416,7 +1417,7 @@
           <a:p>
             <a:fld id="{308EF277-7957-4950-8844-43C656DF05A1}" type="datetimeFigureOut">
               <a:rPr lang="en-US" smtClean="0"/>
-              <a:t>10/2/2019</a:t>
+              <a:t>10/5/2019</a:t>
             </a:fld>
             <a:endParaRPr lang="en-US"/>
           </a:p>
@@ -1831,7 +1832,7 @@
           <a:p>
             <a:fld id="{308EF277-7957-4950-8844-43C656DF05A1}" type="datetimeFigureOut">
               <a:rPr lang="en-US" smtClean="0"/>
-              <a:t>10/2/2019</a:t>
+              <a:t>10/5/2019</a:t>
             </a:fld>
             <a:endParaRPr lang="en-US"/>
           </a:p>
@@ -1973,7 +1974,7 @@
           <a:p>
             <a:fld id="{308EF277-7957-4950-8844-43C656DF05A1}" type="datetimeFigureOut">
               <a:rPr lang="en-US" smtClean="0"/>
-              <a:t>10/2/2019</a:t>
+              <a:t>10/5/2019</a:t>
             </a:fld>
             <a:endParaRPr lang="en-US"/>
           </a:p>
@@ -2086,7 +2087,7 @@
           <a:p>
             <a:fld id="{308EF277-7957-4950-8844-43C656DF05A1}" type="datetimeFigureOut">
               <a:rPr lang="en-US" smtClean="0"/>
-              <a:t>10/2/2019</a:t>
+              <a:t>10/5/2019</a:t>
             </a:fld>
             <a:endParaRPr lang="en-US"/>
           </a:p>
@@ -2399,7 +2400,7 @@
           <a:p>
             <a:fld id="{308EF277-7957-4950-8844-43C656DF05A1}" type="datetimeFigureOut">
               <a:rPr lang="en-US" smtClean="0"/>
-              <a:t>10/2/2019</a:t>
+              <a:t>10/5/2019</a:t>
             </a:fld>
             <a:endParaRPr lang="en-US"/>
           </a:p>
@@ -2688,7 +2689,7 @@
           <a:p>
             <a:fld id="{308EF277-7957-4950-8844-43C656DF05A1}" type="datetimeFigureOut">
               <a:rPr lang="en-US" smtClean="0"/>
-              <a:t>10/2/2019</a:t>
+              <a:t>10/5/2019</a:t>
             </a:fld>
             <a:endParaRPr lang="en-US"/>
           </a:p>
@@ -2931,7 +2932,7 @@
           <a:p>
             <a:fld id="{308EF277-7957-4950-8844-43C656DF05A1}" type="datetimeFigureOut">
               <a:rPr lang="en-US" smtClean="0"/>
-              <a:t>10/2/2019</a:t>
+              <a:t>10/5/2019</a:t>
             </a:fld>
             <a:endParaRPr lang="en-US"/>
           </a:p>
@@ -5134,6 +5135,947 @@
 </p:sld>
 </file>
 
+<file path=ppt/slides/slide3.xml><?xml version="1.0" encoding="utf-8"?>
+<p:sld xmlns:a="http://schemas.openxmlformats.org/drawingml/2006/main" xmlns:r="http://schemas.openxmlformats.org/officeDocument/2006/relationships" xmlns:p="http://schemas.openxmlformats.org/presentationml/2006/main">
+  <p:cSld>
+    <p:spTree>
+      <p:nvGrpSpPr>
+        <p:cNvPr id="1" name=""/>
+        <p:cNvGrpSpPr/>
+        <p:nvPr/>
+      </p:nvGrpSpPr>
+      <p:grpSpPr>
+        <a:xfrm>
+          <a:off x="0" y="0"/>
+          <a:ext cx="0" cy="0"/>
+          <a:chOff x="0" y="0"/>
+          <a:chExt cx="0" cy="0"/>
+        </a:xfrm>
+      </p:grpSpPr>
+      <p:sp>
+        <p:nvSpPr>
+          <p:cNvPr id="2" name="圓角矩形 6">
+            <a:extLst>
+              <a:ext uri="{FF2B5EF4-FFF2-40B4-BE49-F238E27FC236}">
+                <a16:creationId xmlns:a16="http://schemas.microsoft.com/office/drawing/2014/main" id="{706DE702-26E5-46A9-8661-165882CFAF5B}"/>
+              </a:ext>
+            </a:extLst>
+          </p:cNvPr>
+          <p:cNvSpPr/>
+          <p:nvPr/>
+        </p:nvSpPr>
+        <p:spPr>
+          <a:xfrm>
+            <a:off x="1191794" y="1795636"/>
+            <a:ext cx="3392205" cy="2142064"/>
+          </a:xfrm>
+          <a:prstGeom prst="roundRect">
+            <a:avLst/>
+          </a:prstGeom>
+          <a:ln w="25400">
+            <a:solidFill>
+              <a:srgbClr val="FF0000"/>
+            </a:solidFill>
+            <a:prstDash val="sysDash"/>
+          </a:ln>
+        </p:spPr>
+        <p:style>
+          <a:lnRef idx="2">
+            <a:schemeClr val="accent1"/>
+          </a:lnRef>
+          <a:fillRef idx="1">
+            <a:schemeClr val="lt1"/>
+          </a:fillRef>
+          <a:effectRef idx="0">
+            <a:schemeClr val="accent1"/>
+          </a:effectRef>
+          <a:fontRef idx="minor">
+            <a:schemeClr val="dk1"/>
+          </a:fontRef>
+        </p:style>
+        <p:txBody>
+          <a:bodyPr rtlCol="0" anchor="ctr"/>
+          <a:lstStyle/>
+          <a:p>
+            <a:pPr algn="ctr"/>
+            <a:endParaRPr lang="zh-TW" altLang="en-US">
+              <a:latin typeface="Consolas" panose="020B0609020204030204" pitchFamily="49" charset="0"/>
+              <a:cs typeface="Consolas" panose="020B0609020204030204" pitchFamily="49" charset="0"/>
+            </a:endParaRPr>
+          </a:p>
+        </p:txBody>
+      </p:sp>
+      <p:grpSp>
+        <p:nvGrpSpPr>
+          <p:cNvPr id="3" name="群組 2">
+            <a:extLst>
+              <a:ext uri="{FF2B5EF4-FFF2-40B4-BE49-F238E27FC236}">
+                <a16:creationId xmlns:a16="http://schemas.microsoft.com/office/drawing/2014/main" id="{A91D7176-EE55-4C33-B06B-C483824D2263}"/>
+              </a:ext>
+            </a:extLst>
+          </p:cNvPr>
+          <p:cNvGrpSpPr/>
+          <p:nvPr/>
+        </p:nvGrpSpPr>
+        <p:grpSpPr>
+          <a:xfrm>
+            <a:off x="1453415" y="2560044"/>
+            <a:ext cx="2936123" cy="613246"/>
+            <a:chOff x="1027702" y="2502131"/>
+            <a:chExt cx="2309308" cy="492060"/>
+          </a:xfrm>
+        </p:grpSpPr>
+        <p:pic>
+          <p:nvPicPr>
+            <p:cNvPr id="4" name="圖片 3">
+              <a:extLst>
+                <a:ext uri="{FF2B5EF4-FFF2-40B4-BE49-F238E27FC236}">
+                  <a16:creationId xmlns:a16="http://schemas.microsoft.com/office/drawing/2014/main" id="{A5DC711C-CC7B-4BCD-AA24-424BE899958A}"/>
+                </a:ext>
+              </a:extLst>
+            </p:cNvPr>
+            <p:cNvPicPr>
+              <a:picLocks noChangeAspect="1"/>
+            </p:cNvPicPr>
+            <p:nvPr/>
+          </p:nvPicPr>
+          <p:blipFill>
+            <a:blip r:embed="rId2" cstate="print">
+              <a:extLst>
+                <a:ext uri="{28A0092B-C50C-407E-A947-70E740481C1C}">
+                  <a14:useLocalDpi xmlns:a14="http://schemas.microsoft.com/office/drawing/2010/main" val="0"/>
+                </a:ext>
+              </a:extLst>
+            </a:blip>
+            <a:stretch>
+              <a:fillRect/>
+            </a:stretch>
+          </p:blipFill>
+          <p:spPr>
+            <a:xfrm>
+              <a:off x="1027702" y="2502131"/>
+              <a:ext cx="348313" cy="492060"/>
+            </a:xfrm>
+            <a:prstGeom prst="rect">
+              <a:avLst/>
+            </a:prstGeom>
+          </p:spPr>
+        </p:pic>
+        <p:sp>
+          <p:nvSpPr>
+            <p:cNvPr id="5" name="文字方塊 4">
+              <a:extLst>
+                <a:ext uri="{FF2B5EF4-FFF2-40B4-BE49-F238E27FC236}">
+                  <a16:creationId xmlns:a16="http://schemas.microsoft.com/office/drawing/2014/main" id="{CC7ABC9E-01EF-425D-8E74-48A43D9C65CD}"/>
+                </a:ext>
+              </a:extLst>
+            </p:cNvPr>
+            <p:cNvSpPr txBox="1"/>
+            <p:nvPr/>
+          </p:nvSpPr>
+          <p:spPr>
+            <a:xfrm>
+              <a:off x="1338410" y="2618369"/>
+              <a:ext cx="1998600" cy="271651"/>
+            </a:xfrm>
+            <a:prstGeom prst="rect">
+              <a:avLst/>
+            </a:prstGeom>
+            <a:noFill/>
+          </p:spPr>
+          <p:txBody>
+            <a:bodyPr wrap="none" rtlCol="0">
+              <a:spAutoFit/>
+            </a:bodyPr>
+            <a:lstStyle/>
+            <a:p>
+              <a:r>
+                <a:rPr lang="en-US" altLang="zh-TW" sz="1600" b="1" dirty="0">
+                  <a:solidFill>
+                    <a:schemeClr val="tx2">
+                      <a:lumMod val="75000"/>
+                    </a:schemeClr>
+                  </a:solidFill>
+                  <a:latin typeface="Consolas" panose="020B0609020204030204" pitchFamily="49" charset="0"/>
+                  <a:ea typeface="微軟正黑體" panose="020B0604030504040204" pitchFamily="34" charset="-120"/>
+                  <a:cs typeface="Consolas" panose="020B0609020204030204" pitchFamily="49" charset="0"/>
+                </a:rPr>
+                <a:t> ASP.NET Core Web API</a:t>
+              </a:r>
+              <a:endParaRPr lang="zh-TW" altLang="en-US" sz="1600" b="1" dirty="0">
+                <a:solidFill>
+                  <a:schemeClr val="tx2">
+                    <a:lumMod val="75000"/>
+                  </a:schemeClr>
+                </a:solidFill>
+                <a:latin typeface="Consolas" panose="020B0609020204030204" pitchFamily="49" charset="0"/>
+                <a:ea typeface="微軟正黑體" panose="020B0604030504040204" pitchFamily="34" charset="-120"/>
+                <a:cs typeface="Consolas" panose="020B0609020204030204" pitchFamily="49" charset="0"/>
+              </a:endParaRPr>
+            </a:p>
+          </p:txBody>
+        </p:sp>
+      </p:grpSp>
+      <p:sp>
+        <p:nvSpPr>
+          <p:cNvPr id="6" name="矩形 5">
+            <a:extLst>
+              <a:ext uri="{FF2B5EF4-FFF2-40B4-BE49-F238E27FC236}">
+                <a16:creationId xmlns:a16="http://schemas.microsoft.com/office/drawing/2014/main" id="{251C348E-2D22-4DE8-B44D-1701DC2482B8}"/>
+              </a:ext>
+            </a:extLst>
+          </p:cNvPr>
+          <p:cNvSpPr/>
+          <p:nvPr/>
+        </p:nvSpPr>
+        <p:spPr>
+          <a:xfrm>
+            <a:off x="1913538" y="1427691"/>
+            <a:ext cx="1957587" cy="369332"/>
+          </a:xfrm>
+          <a:prstGeom prst="rect">
+            <a:avLst/>
+          </a:prstGeom>
+          <a:noFill/>
+        </p:spPr>
+        <p:txBody>
+          <a:bodyPr wrap="none">
+            <a:spAutoFit/>
+          </a:bodyPr>
+          <a:lstStyle/>
+          <a:p>
+            <a:pPr algn="ctr"/>
+            <a:r>
+              <a:rPr lang="en-US" altLang="zh-TW" b="1" dirty="0">
+                <a:latin typeface="Consolas" panose="020B0609020204030204" pitchFamily="49" charset="0"/>
+                <a:cs typeface="Consolas" panose="020B0609020204030204" pitchFamily="49" charset="0"/>
+              </a:rPr>
+              <a:t>Backend Server</a:t>
+            </a:r>
+          </a:p>
+        </p:txBody>
+      </p:sp>
+      <p:sp>
+        <p:nvSpPr>
+          <p:cNvPr id="7" name="矩形 6">
+            <a:extLst>
+              <a:ext uri="{FF2B5EF4-FFF2-40B4-BE49-F238E27FC236}">
+                <a16:creationId xmlns:a16="http://schemas.microsoft.com/office/drawing/2014/main" id="{449972E5-9A5F-437C-9B35-45C93A8AFF8D}"/>
+              </a:ext>
+            </a:extLst>
+          </p:cNvPr>
+          <p:cNvSpPr/>
+          <p:nvPr/>
+        </p:nvSpPr>
+        <p:spPr>
+          <a:xfrm>
+            <a:off x="1417780" y="2545932"/>
+            <a:ext cx="2944435" cy="613245"/>
+          </a:xfrm>
+          <a:prstGeom prst="rect">
+            <a:avLst/>
+          </a:prstGeom>
+          <a:noFill/>
+          <a:ln>
+            <a:prstDash val="dash"/>
+          </a:ln>
+        </p:spPr>
+        <p:style>
+          <a:lnRef idx="2">
+            <a:schemeClr val="accent1">
+              <a:shade val="50000"/>
+            </a:schemeClr>
+          </a:lnRef>
+          <a:fillRef idx="1">
+            <a:schemeClr val="accent1"/>
+          </a:fillRef>
+          <a:effectRef idx="0">
+            <a:schemeClr val="accent1"/>
+          </a:effectRef>
+          <a:fontRef idx="minor">
+            <a:schemeClr val="lt1"/>
+          </a:fontRef>
+        </p:style>
+        <p:txBody>
+          <a:bodyPr rtlCol="0" anchor="ctr"/>
+          <a:lstStyle/>
+          <a:p>
+            <a:pPr algn="ctr"/>
+            <a:endParaRPr lang="zh-TW" altLang="en-US">
+              <a:latin typeface="Consolas" panose="020B0609020204030204" pitchFamily="49" charset="0"/>
+              <a:cs typeface="Consolas" panose="020B0609020204030204" pitchFamily="49" charset="0"/>
+            </a:endParaRPr>
+          </a:p>
+        </p:txBody>
+      </p:sp>
+      <p:sp>
+        <p:nvSpPr>
+          <p:cNvPr id="8" name="圓角矩形 6">
+            <a:extLst>
+              <a:ext uri="{FF2B5EF4-FFF2-40B4-BE49-F238E27FC236}">
+                <a16:creationId xmlns:a16="http://schemas.microsoft.com/office/drawing/2014/main" id="{A8DE8DDB-CE73-4804-AB78-B70EFB29D495}"/>
+              </a:ext>
+            </a:extLst>
+          </p:cNvPr>
+          <p:cNvSpPr/>
+          <p:nvPr/>
+        </p:nvSpPr>
+        <p:spPr>
+          <a:xfrm>
+            <a:off x="4721486" y="1795636"/>
+            <a:ext cx="3055627" cy="2142064"/>
+          </a:xfrm>
+          <a:prstGeom prst="roundRect">
+            <a:avLst/>
+          </a:prstGeom>
+          <a:ln w="25400">
+            <a:solidFill>
+              <a:srgbClr val="FF0000"/>
+            </a:solidFill>
+            <a:prstDash val="sysDash"/>
+          </a:ln>
+        </p:spPr>
+        <p:style>
+          <a:lnRef idx="2">
+            <a:schemeClr val="accent1"/>
+          </a:lnRef>
+          <a:fillRef idx="1">
+            <a:schemeClr val="lt1"/>
+          </a:fillRef>
+          <a:effectRef idx="0">
+            <a:schemeClr val="accent1"/>
+          </a:effectRef>
+          <a:fontRef idx="minor">
+            <a:schemeClr val="dk1"/>
+          </a:fontRef>
+        </p:style>
+        <p:txBody>
+          <a:bodyPr rtlCol="0" anchor="ctr"/>
+          <a:lstStyle/>
+          <a:p>
+            <a:pPr algn="ctr"/>
+            <a:endParaRPr lang="zh-TW" altLang="en-US">
+              <a:latin typeface="Consolas" panose="020B0609020204030204" pitchFamily="49" charset="0"/>
+              <a:cs typeface="Consolas" panose="020B0609020204030204" pitchFamily="49" charset="0"/>
+            </a:endParaRPr>
+          </a:p>
+        </p:txBody>
+      </p:sp>
+      <p:sp>
+        <p:nvSpPr>
+          <p:cNvPr id="9" name="文字方塊 8">
+            <a:extLst>
+              <a:ext uri="{FF2B5EF4-FFF2-40B4-BE49-F238E27FC236}">
+                <a16:creationId xmlns:a16="http://schemas.microsoft.com/office/drawing/2014/main" id="{EEFEA2BF-382A-4752-B466-E1D2FE26365D}"/>
+              </a:ext>
+            </a:extLst>
+          </p:cNvPr>
+          <p:cNvSpPr txBox="1"/>
+          <p:nvPr/>
+        </p:nvSpPr>
+        <p:spPr>
+          <a:xfrm>
+            <a:off x="5433969" y="2681705"/>
+            <a:ext cx="2204450" cy="338554"/>
+          </a:xfrm>
+          <a:prstGeom prst="rect">
+            <a:avLst/>
+          </a:prstGeom>
+          <a:noFill/>
+        </p:spPr>
+        <p:txBody>
+          <a:bodyPr wrap="none" rtlCol="0">
+            <a:spAutoFit/>
+          </a:bodyPr>
+          <a:lstStyle/>
+          <a:p>
+            <a:r>
+              <a:rPr lang="en-US" altLang="zh-TW" sz="1600" b="1" dirty="0">
+                <a:solidFill>
+                  <a:schemeClr val="tx2">
+                    <a:lumMod val="75000"/>
+                  </a:schemeClr>
+                </a:solidFill>
+                <a:latin typeface="Consolas" panose="020B0609020204030204" pitchFamily="49" charset="0"/>
+                <a:ea typeface="微軟正黑體" panose="020B0604030504040204" pitchFamily="34" charset="-120"/>
+                <a:cs typeface="Consolas" panose="020B0609020204030204" pitchFamily="49" charset="0"/>
+              </a:rPr>
+              <a:t> Identity Server 4</a:t>
+            </a:r>
+            <a:endParaRPr lang="zh-TW" altLang="en-US" sz="1600" b="1" dirty="0">
+              <a:solidFill>
+                <a:schemeClr val="tx2">
+                  <a:lumMod val="75000"/>
+                </a:schemeClr>
+              </a:solidFill>
+              <a:latin typeface="Consolas" panose="020B0609020204030204" pitchFamily="49" charset="0"/>
+              <a:ea typeface="微軟正黑體" panose="020B0604030504040204" pitchFamily="34" charset="-120"/>
+              <a:cs typeface="Consolas" panose="020B0609020204030204" pitchFamily="49" charset="0"/>
+            </a:endParaRPr>
+          </a:p>
+        </p:txBody>
+      </p:sp>
+      <p:sp>
+        <p:nvSpPr>
+          <p:cNvPr id="10" name="矩形 9">
+            <a:extLst>
+              <a:ext uri="{FF2B5EF4-FFF2-40B4-BE49-F238E27FC236}">
+                <a16:creationId xmlns:a16="http://schemas.microsoft.com/office/drawing/2014/main" id="{7FDAF179-9B2E-411A-B0C7-CD050D262008}"/>
+              </a:ext>
+            </a:extLst>
+          </p:cNvPr>
+          <p:cNvSpPr/>
+          <p:nvPr/>
+        </p:nvSpPr>
+        <p:spPr>
+          <a:xfrm>
+            <a:off x="4913832" y="2544360"/>
+            <a:ext cx="2724587" cy="613245"/>
+          </a:xfrm>
+          <a:prstGeom prst="rect">
+            <a:avLst/>
+          </a:prstGeom>
+          <a:noFill/>
+          <a:ln>
+            <a:prstDash val="dash"/>
+          </a:ln>
+        </p:spPr>
+        <p:style>
+          <a:lnRef idx="2">
+            <a:schemeClr val="accent1">
+              <a:shade val="50000"/>
+            </a:schemeClr>
+          </a:lnRef>
+          <a:fillRef idx="1">
+            <a:schemeClr val="accent1"/>
+          </a:fillRef>
+          <a:effectRef idx="0">
+            <a:schemeClr val="accent1"/>
+          </a:effectRef>
+          <a:fontRef idx="minor">
+            <a:schemeClr val="lt1"/>
+          </a:fontRef>
+        </p:style>
+        <p:txBody>
+          <a:bodyPr rtlCol="0" anchor="ctr"/>
+          <a:lstStyle/>
+          <a:p>
+            <a:pPr algn="ctr"/>
+            <a:endParaRPr lang="zh-TW" altLang="en-US">
+              <a:latin typeface="Consolas" panose="020B0609020204030204" pitchFamily="49" charset="0"/>
+              <a:cs typeface="Consolas" panose="020B0609020204030204" pitchFamily="49" charset="0"/>
+            </a:endParaRPr>
+          </a:p>
+        </p:txBody>
+      </p:sp>
+      <p:pic>
+        <p:nvPicPr>
+          <p:cNvPr id="11" name="圖片 10">
+            <a:extLst>
+              <a:ext uri="{FF2B5EF4-FFF2-40B4-BE49-F238E27FC236}">
+                <a16:creationId xmlns:a16="http://schemas.microsoft.com/office/drawing/2014/main" id="{5BE1084A-E4FD-4463-932D-30523A0449CF}"/>
+              </a:ext>
+            </a:extLst>
+          </p:cNvPr>
+          <p:cNvPicPr>
+            <a:picLocks noChangeAspect="1"/>
+          </p:cNvPicPr>
+          <p:nvPr/>
+        </p:nvPicPr>
+        <p:blipFill>
+          <a:blip r:embed="rId3">
+            <a:extLst>
+              <a:ext uri="{28A0092B-C50C-407E-A947-70E740481C1C}">
+                <a14:useLocalDpi xmlns:a14="http://schemas.microsoft.com/office/drawing/2010/main" val="0"/>
+              </a:ext>
+            </a:extLst>
+          </a:blip>
+          <a:stretch>
+            <a:fillRect/>
+          </a:stretch>
+        </p:blipFill>
+        <p:spPr>
+          <a:xfrm>
+            <a:off x="5107298" y="2628529"/>
+            <a:ext cx="408171" cy="444906"/>
+          </a:xfrm>
+          <a:prstGeom prst="rect">
+            <a:avLst/>
+          </a:prstGeom>
+        </p:spPr>
+      </p:pic>
+      <p:sp>
+        <p:nvSpPr>
+          <p:cNvPr id="12" name="矩形 11">
+            <a:extLst>
+              <a:ext uri="{FF2B5EF4-FFF2-40B4-BE49-F238E27FC236}">
+                <a16:creationId xmlns:a16="http://schemas.microsoft.com/office/drawing/2014/main" id="{C50DCA4B-3556-4099-9C32-9297DAF2DB06}"/>
+              </a:ext>
+            </a:extLst>
+          </p:cNvPr>
+          <p:cNvSpPr/>
+          <p:nvPr/>
+        </p:nvSpPr>
+        <p:spPr>
+          <a:xfrm>
+            <a:off x="4835668" y="1440977"/>
+            <a:ext cx="2844048" cy="369332"/>
+          </a:xfrm>
+          <a:prstGeom prst="rect">
+            <a:avLst/>
+          </a:prstGeom>
+          <a:noFill/>
+        </p:spPr>
+        <p:txBody>
+          <a:bodyPr wrap="none">
+            <a:spAutoFit/>
+          </a:bodyPr>
+          <a:lstStyle/>
+          <a:p>
+            <a:pPr algn="ctr"/>
+            <a:r>
+              <a:rPr lang="en-US" altLang="zh-TW" b="1" dirty="0">
+                <a:latin typeface="Consolas" panose="020B0609020204030204" pitchFamily="49" charset="0"/>
+                <a:cs typeface="Consolas" panose="020B0609020204030204" pitchFamily="49" charset="0"/>
+              </a:rPr>
+              <a:t>Authentication Server</a:t>
+            </a:r>
+          </a:p>
+        </p:txBody>
+      </p:sp>
+      <p:cxnSp>
+        <p:nvCxnSpPr>
+          <p:cNvPr id="13" name="直線單箭頭接點 12">
+            <a:extLst>
+              <a:ext uri="{FF2B5EF4-FFF2-40B4-BE49-F238E27FC236}">
+                <a16:creationId xmlns:a16="http://schemas.microsoft.com/office/drawing/2014/main" id="{F960792B-F82F-44F4-AC09-EEFA605794A2}"/>
+              </a:ext>
+            </a:extLst>
+          </p:cNvPr>
+          <p:cNvCxnSpPr>
+            <a:cxnSpLocks/>
+            <a:stCxn id="7" idx="3"/>
+          </p:cNvCxnSpPr>
+          <p:nvPr/>
+        </p:nvCxnSpPr>
+        <p:spPr>
+          <a:xfrm>
+            <a:off x="4362215" y="2852555"/>
+            <a:ext cx="579563" cy="0"/>
+          </a:xfrm>
+          <a:prstGeom prst="straightConnector1">
+            <a:avLst/>
+          </a:prstGeom>
+          <a:ln>
+            <a:tailEnd type="arrow"/>
+          </a:ln>
+        </p:spPr>
+        <p:style>
+          <a:lnRef idx="1">
+            <a:schemeClr val="accent1"/>
+          </a:lnRef>
+          <a:fillRef idx="0">
+            <a:schemeClr val="accent1"/>
+          </a:fillRef>
+          <a:effectRef idx="0">
+            <a:schemeClr val="accent1"/>
+          </a:effectRef>
+          <a:fontRef idx="minor">
+            <a:schemeClr val="tx1"/>
+          </a:fontRef>
+        </p:style>
+      </p:cxnSp>
+      <p:sp>
+        <p:nvSpPr>
+          <p:cNvPr id="14" name="圓角矩形 6">
+            <a:extLst>
+              <a:ext uri="{FF2B5EF4-FFF2-40B4-BE49-F238E27FC236}">
+                <a16:creationId xmlns:a16="http://schemas.microsoft.com/office/drawing/2014/main" id="{7CD9D1F1-45AB-4A83-BAF4-DB58F90FD930}"/>
+              </a:ext>
+            </a:extLst>
+          </p:cNvPr>
+          <p:cNvSpPr/>
+          <p:nvPr/>
+        </p:nvSpPr>
+        <p:spPr>
+          <a:xfrm>
+            <a:off x="8028782" y="1795636"/>
+            <a:ext cx="3055627" cy="2142064"/>
+          </a:xfrm>
+          <a:prstGeom prst="roundRect">
+            <a:avLst/>
+          </a:prstGeom>
+          <a:ln>
+            <a:prstDash val="sysDash"/>
+          </a:ln>
+        </p:spPr>
+        <p:style>
+          <a:lnRef idx="2">
+            <a:schemeClr val="accent1"/>
+          </a:lnRef>
+          <a:fillRef idx="1">
+            <a:schemeClr val="lt1"/>
+          </a:fillRef>
+          <a:effectRef idx="0">
+            <a:schemeClr val="accent1"/>
+          </a:effectRef>
+          <a:fontRef idx="minor">
+            <a:schemeClr val="dk1"/>
+          </a:fontRef>
+        </p:style>
+        <p:txBody>
+          <a:bodyPr rtlCol="0" anchor="ctr"/>
+          <a:lstStyle/>
+          <a:p>
+            <a:pPr algn="ctr"/>
+            <a:endParaRPr lang="zh-TW" altLang="en-US" dirty="0">
+              <a:latin typeface="Consolas" panose="020B0609020204030204" pitchFamily="49" charset="0"/>
+              <a:cs typeface="Consolas" panose="020B0609020204030204" pitchFamily="49" charset="0"/>
+            </a:endParaRPr>
+          </a:p>
+        </p:txBody>
+      </p:sp>
+      <p:sp>
+        <p:nvSpPr>
+          <p:cNvPr id="15" name="文字方塊 14">
+            <a:extLst>
+              <a:ext uri="{FF2B5EF4-FFF2-40B4-BE49-F238E27FC236}">
+                <a16:creationId xmlns:a16="http://schemas.microsoft.com/office/drawing/2014/main" id="{2A38FED3-41D3-4F5C-994A-88677072ED11}"/>
+              </a:ext>
+            </a:extLst>
+          </p:cNvPr>
+          <p:cNvSpPr txBox="1"/>
+          <p:nvPr/>
+        </p:nvSpPr>
+        <p:spPr>
+          <a:xfrm>
+            <a:off x="8795755" y="2672827"/>
+            <a:ext cx="2204450" cy="338554"/>
+          </a:xfrm>
+          <a:prstGeom prst="rect">
+            <a:avLst/>
+          </a:prstGeom>
+          <a:noFill/>
+        </p:spPr>
+        <p:txBody>
+          <a:bodyPr wrap="none" rtlCol="0">
+            <a:spAutoFit/>
+          </a:bodyPr>
+          <a:lstStyle/>
+          <a:p>
+            <a:r>
+              <a:rPr lang="en-US" altLang="zh-TW" sz="1600" b="1" dirty="0">
+                <a:solidFill>
+                  <a:schemeClr val="tx2">
+                    <a:lumMod val="75000"/>
+                  </a:schemeClr>
+                </a:solidFill>
+                <a:latin typeface="Consolas" panose="020B0609020204030204" pitchFamily="49" charset="0"/>
+                <a:ea typeface="微軟正黑體" panose="020B0604030504040204" pitchFamily="34" charset="-120"/>
+                <a:cs typeface="Consolas" panose="020B0609020204030204" pitchFamily="49" charset="0"/>
+              </a:rPr>
+              <a:t>OpenLDAP container</a:t>
+            </a:r>
+            <a:endParaRPr lang="zh-TW" altLang="en-US" sz="1600" b="1" dirty="0">
+              <a:solidFill>
+                <a:schemeClr val="tx2">
+                  <a:lumMod val="75000"/>
+                </a:schemeClr>
+              </a:solidFill>
+              <a:latin typeface="Consolas" panose="020B0609020204030204" pitchFamily="49" charset="0"/>
+              <a:ea typeface="微軟正黑體" panose="020B0604030504040204" pitchFamily="34" charset="-120"/>
+              <a:cs typeface="Consolas" panose="020B0609020204030204" pitchFamily="49" charset="0"/>
+            </a:endParaRPr>
+          </a:p>
+        </p:txBody>
+      </p:sp>
+      <p:sp>
+        <p:nvSpPr>
+          <p:cNvPr id="16" name="矩形 15">
+            <a:extLst>
+              <a:ext uri="{FF2B5EF4-FFF2-40B4-BE49-F238E27FC236}">
+                <a16:creationId xmlns:a16="http://schemas.microsoft.com/office/drawing/2014/main" id="{9D918EDB-4CFC-4B66-9EB0-A862160D0A27}"/>
+              </a:ext>
+            </a:extLst>
+          </p:cNvPr>
+          <p:cNvSpPr/>
+          <p:nvPr/>
+        </p:nvSpPr>
+        <p:spPr>
+          <a:xfrm>
+            <a:off x="8194302" y="2551167"/>
+            <a:ext cx="2724587" cy="613245"/>
+          </a:xfrm>
+          <a:prstGeom prst="rect">
+            <a:avLst/>
+          </a:prstGeom>
+          <a:noFill/>
+          <a:ln>
+            <a:prstDash val="dash"/>
+          </a:ln>
+        </p:spPr>
+        <p:style>
+          <a:lnRef idx="2">
+            <a:schemeClr val="accent1">
+              <a:shade val="50000"/>
+            </a:schemeClr>
+          </a:lnRef>
+          <a:fillRef idx="1">
+            <a:schemeClr val="accent1"/>
+          </a:fillRef>
+          <a:effectRef idx="0">
+            <a:schemeClr val="accent1"/>
+          </a:effectRef>
+          <a:fontRef idx="minor">
+            <a:schemeClr val="lt1"/>
+          </a:fontRef>
+        </p:style>
+        <p:txBody>
+          <a:bodyPr rtlCol="0" anchor="ctr"/>
+          <a:lstStyle/>
+          <a:p>
+            <a:pPr algn="ctr"/>
+            <a:endParaRPr lang="zh-TW" altLang="en-US">
+              <a:latin typeface="Consolas" panose="020B0609020204030204" pitchFamily="49" charset="0"/>
+              <a:cs typeface="Consolas" panose="020B0609020204030204" pitchFamily="49" charset="0"/>
+            </a:endParaRPr>
+          </a:p>
+        </p:txBody>
+      </p:sp>
+      <p:pic>
+        <p:nvPicPr>
+          <p:cNvPr id="17" name="圖片 16">
+            <a:extLst>
+              <a:ext uri="{FF2B5EF4-FFF2-40B4-BE49-F238E27FC236}">
+                <a16:creationId xmlns:a16="http://schemas.microsoft.com/office/drawing/2014/main" id="{0EFF49B5-497B-4921-8CF6-BD4E4B674ADF}"/>
+              </a:ext>
+            </a:extLst>
+          </p:cNvPr>
+          <p:cNvPicPr>
+            <a:picLocks noChangeAspect="1"/>
+          </p:cNvPicPr>
+          <p:nvPr/>
+        </p:nvPicPr>
+        <p:blipFill>
+          <a:blip r:embed="rId2" cstate="print">
+            <a:extLst>
+              <a:ext uri="{28A0092B-C50C-407E-A947-70E740481C1C}">
+                <a14:useLocalDpi xmlns:a14="http://schemas.microsoft.com/office/drawing/2010/main" val="0"/>
+              </a:ext>
+            </a:extLst>
+          </a:blip>
+          <a:stretch>
+            <a:fillRect/>
+          </a:stretch>
+        </p:blipFill>
+        <p:spPr>
+          <a:xfrm>
+            <a:off x="8283881" y="2612725"/>
+            <a:ext cx="422295" cy="501739"/>
+          </a:xfrm>
+          <a:prstGeom prst="rect">
+            <a:avLst/>
+          </a:prstGeom>
+        </p:spPr>
+      </p:pic>
+      <p:pic>
+        <p:nvPicPr>
+          <p:cNvPr id="18" name="圖片 17">
+            <a:extLst>
+              <a:ext uri="{FF2B5EF4-FFF2-40B4-BE49-F238E27FC236}">
+                <a16:creationId xmlns:a16="http://schemas.microsoft.com/office/drawing/2014/main" id="{65E53252-C355-4873-ABD1-69208ED76225}"/>
+              </a:ext>
+            </a:extLst>
+          </p:cNvPr>
+          <p:cNvPicPr>
+            <a:picLocks noChangeAspect="1"/>
+          </p:cNvPicPr>
+          <p:nvPr/>
+        </p:nvPicPr>
+        <p:blipFill>
+          <a:blip r:embed="rId4"/>
+          <a:stretch>
+            <a:fillRect/>
+          </a:stretch>
+        </p:blipFill>
+        <p:spPr>
+          <a:xfrm>
+            <a:off x="8795755" y="1612357"/>
+            <a:ext cx="1407316" cy="366557"/>
+          </a:xfrm>
+          <a:prstGeom prst="rect">
+            <a:avLst/>
+          </a:prstGeom>
+        </p:spPr>
+      </p:pic>
+      <p:cxnSp>
+        <p:nvCxnSpPr>
+          <p:cNvPr id="19" name="直線單箭頭接點 18">
+            <a:extLst>
+              <a:ext uri="{FF2B5EF4-FFF2-40B4-BE49-F238E27FC236}">
+                <a16:creationId xmlns:a16="http://schemas.microsoft.com/office/drawing/2014/main" id="{4FD714C3-D43C-4AE3-A614-B9AE37447913}"/>
+              </a:ext>
+            </a:extLst>
+          </p:cNvPr>
+          <p:cNvCxnSpPr>
+            <a:cxnSpLocks/>
+            <a:stCxn id="10" idx="3"/>
+            <a:endCxn id="16" idx="1"/>
+          </p:cNvCxnSpPr>
+          <p:nvPr/>
+        </p:nvCxnSpPr>
+        <p:spPr>
+          <a:xfrm>
+            <a:off x="7638419" y="2850983"/>
+            <a:ext cx="555883" cy="6807"/>
+          </a:xfrm>
+          <a:prstGeom prst="straightConnector1">
+            <a:avLst/>
+          </a:prstGeom>
+          <a:ln>
+            <a:tailEnd type="arrow"/>
+          </a:ln>
+        </p:spPr>
+        <p:style>
+          <a:lnRef idx="1">
+            <a:schemeClr val="accent1"/>
+          </a:lnRef>
+          <a:fillRef idx="0">
+            <a:schemeClr val="accent1"/>
+          </a:fillRef>
+          <a:effectRef idx="0">
+            <a:schemeClr val="accent1"/>
+          </a:effectRef>
+          <a:fontRef idx="minor">
+            <a:schemeClr val="tx1"/>
+          </a:fontRef>
+        </p:style>
+      </p:cxnSp>
+      <p:sp>
+        <p:nvSpPr>
+          <p:cNvPr id="20" name="語音泡泡: 矩形 19">
+            <a:extLst>
+              <a:ext uri="{FF2B5EF4-FFF2-40B4-BE49-F238E27FC236}">
+                <a16:creationId xmlns:a16="http://schemas.microsoft.com/office/drawing/2014/main" id="{B0052EBC-8056-4CFC-9B7E-870F38D20FD1}"/>
+              </a:ext>
+            </a:extLst>
+          </p:cNvPr>
+          <p:cNvSpPr/>
+          <p:nvPr/>
+        </p:nvSpPr>
+        <p:spPr>
+          <a:xfrm>
+            <a:off x="1617356" y="4318963"/>
+            <a:ext cx="2541080" cy="735291"/>
+          </a:xfrm>
+          <a:prstGeom prst="wedgeRectCallout">
+            <a:avLst>
+              <a:gd name="adj1" fmla="val 43717"/>
+              <a:gd name="adj2" fmla="val -137500"/>
+            </a:avLst>
+          </a:prstGeom>
+        </p:spPr>
+        <p:style>
+          <a:lnRef idx="2">
+            <a:schemeClr val="accent2">
+              <a:shade val="50000"/>
+            </a:schemeClr>
+          </a:lnRef>
+          <a:fillRef idx="1">
+            <a:schemeClr val="accent2"/>
+          </a:fillRef>
+          <a:effectRef idx="0">
+            <a:schemeClr val="accent2"/>
+          </a:effectRef>
+          <a:fontRef idx="minor">
+            <a:schemeClr val="lt1"/>
+          </a:fontRef>
+        </p:style>
+        <p:txBody>
+          <a:bodyPr rtlCol="0" anchor="ctr"/>
+          <a:lstStyle/>
+          <a:p>
+            <a:pPr algn="ctr"/>
+            <a:r>
+              <a:rPr lang="en-US" dirty="0"/>
+              <a:t>Secure API with Policies</a:t>
+            </a:r>
+          </a:p>
+        </p:txBody>
+      </p:sp>
+      <p:sp>
+        <p:nvSpPr>
+          <p:cNvPr id="21" name="語音泡泡: 矩形 20">
+            <a:extLst>
+              <a:ext uri="{FF2B5EF4-FFF2-40B4-BE49-F238E27FC236}">
+                <a16:creationId xmlns:a16="http://schemas.microsoft.com/office/drawing/2014/main" id="{53CD2CE1-4D7B-4C00-BFBA-40FA2850023D}"/>
+              </a:ext>
+            </a:extLst>
+          </p:cNvPr>
+          <p:cNvSpPr/>
+          <p:nvPr/>
+        </p:nvSpPr>
+        <p:spPr>
+          <a:xfrm>
+            <a:off x="4941778" y="4318963"/>
+            <a:ext cx="2541080" cy="735291"/>
+          </a:xfrm>
+          <a:prstGeom prst="wedgeRectCallout">
+            <a:avLst>
+              <a:gd name="adj1" fmla="val -28252"/>
+              <a:gd name="adj2" fmla="val -150872"/>
+            </a:avLst>
+          </a:prstGeom>
+        </p:spPr>
+        <p:style>
+          <a:lnRef idx="2">
+            <a:schemeClr val="accent2">
+              <a:shade val="50000"/>
+            </a:schemeClr>
+          </a:lnRef>
+          <a:fillRef idx="1">
+            <a:schemeClr val="accent2"/>
+          </a:fillRef>
+          <a:effectRef idx="0">
+            <a:schemeClr val="accent2"/>
+          </a:effectRef>
+          <a:fontRef idx="minor">
+            <a:schemeClr val="lt1"/>
+          </a:fontRef>
+        </p:style>
+        <p:txBody>
+          <a:bodyPr rtlCol="0" anchor="ctr"/>
+          <a:lstStyle/>
+          <a:p>
+            <a:pPr algn="ctr"/>
+            <a:r>
+              <a:rPr lang="en-US" dirty="0"/>
+              <a:t>Add </a:t>
+            </a:r>
+            <a:r>
+              <a:rPr lang="en-US" dirty="0" err="1"/>
+              <a:t>reuired</a:t>
+            </a:r>
+            <a:r>
+              <a:rPr lang="en-US" dirty="0"/>
+              <a:t> claims for Policy when issue an JWT token</a:t>
+            </a:r>
+          </a:p>
+        </p:txBody>
+      </p:sp>
+    </p:spTree>
+    <p:extLst>
+      <p:ext uri="{BB962C8B-B14F-4D97-AF65-F5344CB8AC3E}">
+        <p14:creationId xmlns:p14="http://schemas.microsoft.com/office/powerpoint/2010/main" val="1521631976"/>
+      </p:ext>
+    </p:extLst>
+  </p:cSld>
+  <p:clrMapOvr>
+    <a:masterClrMapping/>
+  </p:clrMapOvr>
+</p:sld>
+</file>
+
 <file path=ppt/theme/theme1.xml><?xml version="1.0" encoding="utf-8"?>
 <a:theme xmlns:a="http://schemas.openxmlformats.org/drawingml/2006/main" name="Office 佈景主題">
   <a:themeElements>

</xml_diff>

<commit_message>
Complete tutorial for policy-based authorization
</commit_message>
<xml_diff>
--- a/Doc/Architecture.pptx
+++ b/Doc/Architecture.pptx
@@ -263,7 +263,7 @@
           <a:p>
             <a:fld id="{308EF277-7957-4950-8844-43C656DF05A1}" type="datetimeFigureOut">
               <a:rPr lang="en-US" smtClean="0"/>
-              <a:t>10/5/2019</a:t>
+              <a:t>10/7/2019</a:t>
             </a:fld>
             <a:endParaRPr lang="en-US"/>
           </a:p>
@@ -463,7 +463,7 @@
           <a:p>
             <a:fld id="{308EF277-7957-4950-8844-43C656DF05A1}" type="datetimeFigureOut">
               <a:rPr lang="en-US" smtClean="0"/>
-              <a:t>10/5/2019</a:t>
+              <a:t>10/7/2019</a:t>
             </a:fld>
             <a:endParaRPr lang="en-US"/>
           </a:p>
@@ -673,7 +673,7 @@
           <a:p>
             <a:fld id="{308EF277-7957-4950-8844-43C656DF05A1}" type="datetimeFigureOut">
               <a:rPr lang="en-US" smtClean="0"/>
-              <a:t>10/5/2019</a:t>
+              <a:t>10/7/2019</a:t>
             </a:fld>
             <a:endParaRPr lang="en-US"/>
           </a:p>
@@ -873,7 +873,7 @@
           <a:p>
             <a:fld id="{308EF277-7957-4950-8844-43C656DF05A1}" type="datetimeFigureOut">
               <a:rPr lang="en-US" smtClean="0"/>
-              <a:t>10/5/2019</a:t>
+              <a:t>10/7/2019</a:t>
             </a:fld>
             <a:endParaRPr lang="en-US"/>
           </a:p>
@@ -1149,7 +1149,7 @@
           <a:p>
             <a:fld id="{308EF277-7957-4950-8844-43C656DF05A1}" type="datetimeFigureOut">
               <a:rPr lang="en-US" smtClean="0"/>
-              <a:t>10/5/2019</a:t>
+              <a:t>10/7/2019</a:t>
             </a:fld>
             <a:endParaRPr lang="en-US"/>
           </a:p>
@@ -1417,7 +1417,7 @@
           <a:p>
             <a:fld id="{308EF277-7957-4950-8844-43C656DF05A1}" type="datetimeFigureOut">
               <a:rPr lang="en-US" smtClean="0"/>
-              <a:t>10/5/2019</a:t>
+              <a:t>10/7/2019</a:t>
             </a:fld>
             <a:endParaRPr lang="en-US"/>
           </a:p>
@@ -1832,7 +1832,7 @@
           <a:p>
             <a:fld id="{308EF277-7957-4950-8844-43C656DF05A1}" type="datetimeFigureOut">
               <a:rPr lang="en-US" smtClean="0"/>
-              <a:t>10/5/2019</a:t>
+              <a:t>10/7/2019</a:t>
             </a:fld>
             <a:endParaRPr lang="en-US"/>
           </a:p>
@@ -1974,7 +1974,7 @@
           <a:p>
             <a:fld id="{308EF277-7957-4950-8844-43C656DF05A1}" type="datetimeFigureOut">
               <a:rPr lang="en-US" smtClean="0"/>
-              <a:t>10/5/2019</a:t>
+              <a:t>10/7/2019</a:t>
             </a:fld>
             <a:endParaRPr lang="en-US"/>
           </a:p>
@@ -2087,7 +2087,7 @@
           <a:p>
             <a:fld id="{308EF277-7957-4950-8844-43C656DF05A1}" type="datetimeFigureOut">
               <a:rPr lang="en-US" smtClean="0"/>
-              <a:t>10/5/2019</a:t>
+              <a:t>10/7/2019</a:t>
             </a:fld>
             <a:endParaRPr lang="en-US"/>
           </a:p>
@@ -2400,7 +2400,7 @@
           <a:p>
             <a:fld id="{308EF277-7957-4950-8844-43C656DF05A1}" type="datetimeFigureOut">
               <a:rPr lang="en-US" smtClean="0"/>
-              <a:t>10/5/2019</a:t>
+              <a:t>10/7/2019</a:t>
             </a:fld>
             <a:endParaRPr lang="en-US"/>
           </a:p>
@@ -2689,7 +2689,7 @@
           <a:p>
             <a:fld id="{308EF277-7957-4950-8844-43C656DF05A1}" type="datetimeFigureOut">
               <a:rPr lang="en-US" smtClean="0"/>
-              <a:t>10/5/2019</a:t>
+              <a:t>10/7/2019</a:t>
             </a:fld>
             <a:endParaRPr lang="en-US"/>
           </a:p>
@@ -2932,7 +2932,7 @@
           <a:p>
             <a:fld id="{308EF277-7957-4950-8844-43C656DF05A1}" type="datetimeFigureOut">
               <a:rPr lang="en-US" smtClean="0"/>
-              <a:t>10/5/2019</a:t>
+              <a:t>10/7/2019</a:t>
             </a:fld>
             <a:endParaRPr lang="en-US"/>
           </a:p>
@@ -6017,8 +6017,8 @@
         </p:nvSpPr>
         <p:spPr>
           <a:xfrm>
-            <a:off x="4941778" y="4318963"/>
-            <a:ext cx="2541080" cy="735291"/>
+            <a:off x="4978759" y="4572804"/>
+            <a:ext cx="2541080" cy="962900"/>
           </a:xfrm>
           <a:prstGeom prst="wedgeRectCallout">
             <a:avLst>
@@ -6050,15 +6050,7 @@
             <a:pPr algn="ctr"/>
             <a:r>
               <a:rPr lang="en-US" dirty="0"/>
-              <a:t>Add </a:t>
-            </a:r>
-            <a:r>
-              <a:rPr lang="en-US" dirty="0" err="1"/>
-              <a:t>reuired</a:t>
-            </a:r>
-            <a:r>
-              <a:rPr lang="en-US" dirty="0"/>
-              <a:t> claims for Policy when issue an JWT token</a:t>
+              <a:t>Add required claims for Policy when issue an JWT token</a:t>
             </a:r>
           </a:p>
         </p:txBody>

</xml_diff>